<commit_message>
Tweaked Template for Tables
</commit_message>
<xml_diff>
--- a/autosprintreview/Sprint Review Template.pptx
+++ b/autosprintreview/Sprint Review Template.pptx
@@ -320,7 +320,7 @@
           <a:p>
             <a:fld id="{0E4F843C-02CF-4FF2-BA34-CB663F93E08D}" type="datetimeFigureOut">
               <a:rPr lang="en-US" smtClean="0"/>
-              <a:t>1/14/2022</a:t>
+              <a:t>1/19/2022</a:t>
             </a:fld>
             <a:endParaRPr lang="en-US"/>
           </a:p>
@@ -485,7 +485,7 @@
           <a:p>
             <a:fld id="{548941D1-C473-44A6-B53E-C1FBB2FADE00}" type="datetimeFigureOut">
               <a:rPr lang="en-US" smtClean="0"/>
-              <a:t>1/14/2022</a:t>
+              <a:t>1/19/2022</a:t>
             </a:fld>
             <a:endParaRPr lang="en-US"/>
           </a:p>
@@ -9952,11 +9952,17 @@
           <p:cNvGraphicFramePr>
             <a:graphicFrameLocks noGrp="1"/>
           </p:cNvGraphicFramePr>
-          <p:nvPr/>
+          <p:nvPr>
+            <p:extLst>
+              <p:ext uri="{D42A27DB-BD31-4B8C-83A1-F6EECF244321}">
+                <p14:modId xmlns:p14="http://schemas.microsoft.com/office/powerpoint/2010/main" val="3754160589"/>
+              </p:ext>
+            </p:extLst>
+          </p:nvPr>
         </p:nvGraphicFramePr>
         <p:xfrm>
           <a:off x="461473" y="719666"/>
-          <a:ext cx="11365908" cy="741680"/>
+          <a:ext cx="9759299" cy="741680"/>
         </p:xfrm>
         <a:graphic>
           <a:graphicData uri="http://schemas.openxmlformats.org/drawingml/2006/table">
@@ -9969,13 +9975,6 @@
                   <a:extLst>
                     <a:ext uri="{9D8B030D-6E8A-4147-A177-3AD203B41FA5}">
                       <a16:colId xmlns:a16="http://schemas.microsoft.com/office/drawing/2014/main" val="39807748"/>
-                    </a:ext>
-                  </a:extLst>
-                </a:gridCol>
-                <a:gridCol w="1606609">
-                  <a:extLst>
-                    <a:ext uri="{9D8B030D-6E8A-4147-A177-3AD203B41FA5}">
-                      <a16:colId xmlns:a16="http://schemas.microsoft.com/office/drawing/2014/main" val="587913071"/>
                     </a:ext>
                   </a:extLst>
                 </a:gridCol>
@@ -10002,7 +10001,7 @@
                     <a:p>
                       <a:r>
                         <a:rPr lang="en-GB" dirty="0"/>
-                        <a:t>[BI.ID]</a:t>
+                        <a:t>Azure ID</a:t>
                       </a:r>
                     </a:p>
                   </a:txBody>
@@ -10015,7 +10014,7 @@
                     <a:p>
                       <a:r>
                         <a:rPr lang="en-GB" dirty="0"/>
-                        <a:t>[BI.WIT]</a:t>
+                        <a:t>Title</a:t>
                       </a:r>
                     </a:p>
                   </a:txBody>
@@ -10028,37 +10027,7 @@
                     <a:p>
                       <a:r>
                         <a:rPr lang="en-GB" dirty="0"/>
-                        <a:t>[</a:t>
-                      </a:r>
-                      <a:r>
-                        <a:rPr lang="en-GB" b="0" dirty="0" err="1"/>
-                        <a:t>BI.Title</a:t>
-                      </a:r>
-                      <a:r>
-                        <a:rPr lang="en-GB" b="0" dirty="0"/>
-                        <a:t>]</a:t>
-                      </a:r>
-                      <a:endParaRPr lang="en-GB" dirty="0"/>
-                    </a:p>
-                  </a:txBody>
-                  <a:tcPr/>
-                </a:tc>
-                <a:tc>
-                  <a:txBody>
-                    <a:bodyPr/>
-                    <a:lstStyle/>
-                    <a:p>
-                      <a:r>
-                        <a:rPr lang="en-GB" dirty="0"/>
-                        <a:t>[</a:t>
-                      </a:r>
-                      <a:r>
-                        <a:rPr lang="en-GB" dirty="0" err="1"/>
-                        <a:t>BI.Effort</a:t>
-                      </a:r>
-                      <a:r>
-                        <a:rPr lang="en-GB" dirty="0"/>
-                        <a:t>]</a:t>
+                        <a:t>Points</a:t>
                       </a:r>
                     </a:p>
                   </a:txBody>
@@ -10080,21 +10049,7 @@
                         <a:rPr lang="en-GB" dirty="0">
                           <a:hlinkClick r:id="rId2"/>
                         </a:rPr>
-                        <a:t>123456</a:t>
-                      </a:r>
-                      <a:endParaRPr lang="en-GB" dirty="0"/>
-                    </a:p>
-                  </a:txBody>
-                  <a:tcPr/>
-                </a:tc>
-                <a:tc>
-                  <a:txBody>
-                    <a:bodyPr/>
-                    <a:lstStyle/>
-                    <a:p>
-                      <a:r>
-                        <a:rPr lang="en-GB" dirty="0" err="1"/>
-                        <a:t>BacklogItem</a:t>
+                        <a:t>2959417</a:t>
                       </a:r>
                       <a:endParaRPr lang="en-GB" dirty="0"/>
                     </a:p>

</xml_diff>